<commit_message>
Modified TCSP 8 Presentation
</commit_message>
<xml_diff>
--- a/doc/TCSP_8_Patent_Liability.pptx
+++ b/doc/TCSP_8_Patent_Liability.pptx
@@ -3393,15 +3393,7 @@
             </a:br>
             <a:r>
               <a:rPr lang="en-US" sz="5200" dirty="0" smtClean="0"/>
-              <a:t>TCSP #</a:t>
-            </a:r>
-            <a:r>
-              <a:rPr lang="en-US" sz="5200" dirty="0" smtClean="0"/>
-              <a:t>08</a:t>
-            </a:r>
-            <a:r>
-              <a:rPr lang="en-US" sz="5200" dirty="0" smtClean="0"/>
-              <a:t/>
+              <a:t>TCSP #08</a:t>
             </a:r>
             <a:br>
               <a:rPr lang="en-US" sz="5200" dirty="0" smtClean="0"/>
@@ -3416,10 +3408,6 @@
             <a:r>
               <a:rPr lang="en-US" sz="5200" dirty="0" smtClean="0"/>
               <a:t>Patent Liability Analysis</a:t>
-            </a:r>
-            <a:r>
-              <a:rPr lang="en-US" sz="5200" dirty="0" smtClean="0"/>
-              <a:t/>
             </a:r>
             <a:br>
               <a:rPr lang="en-US" sz="5200" dirty="0" smtClean="0"/>
@@ -3551,7 +3539,6 @@
               <a:rPr lang="en-US" sz="3600" dirty="0"/>
               <a:t>Augmented reality and location determination methods and apparatus</a:t>
             </a:r>
-            <a:endParaRPr lang="en-US" sz="3600" dirty="0"/>
           </a:p>
         </p:txBody>
       </p:sp>
@@ -4179,7 +4166,6 @@
               <a:rPr lang="en-US" dirty="0" smtClean="0"/>
               <a:t>www.google.com/patents/US20130267309?dq=augmented+reality+games&amp;hl=en&amp;sa=X&amp;ei=209xUqPwLMT4yQHxxoG4DA&amp;sqi=2&amp;pjf=1&amp;ved=0CDcQ6AEwAA</a:t>
             </a:r>
-            <a:endParaRPr lang="en-US" dirty="0" smtClean="0"/>
           </a:p>
           <a:p>
             <a:endParaRPr lang="en-US" dirty="0" smtClean="0"/>
@@ -4535,10 +4521,34 @@
         </p:nvSpPr>
         <p:spPr/>
         <p:txBody>
-          <a:bodyPr/>
-          <a:lstStyle/>
-          <a:p>
-            <a:endParaRPr lang="en-US"/>
+          <a:bodyPr>
+            <a:normAutofit/>
+          </a:bodyPr>
+          <a:lstStyle/>
+          <a:p>
+            <a:r>
+              <a:rPr lang="en-US" sz="2800" dirty="0" smtClean="0"/>
+              <a:t>Using IMU/GPS to determine orientation/position of user in 3D environment</a:t>
+            </a:r>
+          </a:p>
+          <a:p>
+            <a:endParaRPr lang="en-US" sz="2800" dirty="0" smtClean="0"/>
+          </a:p>
+          <a:p>
+            <a:r>
+              <a:rPr lang="en-US" sz="2800" dirty="0" smtClean="0"/>
+              <a:t>Use of IMU/GPS data to render images.</a:t>
+            </a:r>
+          </a:p>
+          <a:p>
+            <a:endParaRPr lang="en-US" sz="2800" dirty="0" smtClean="0"/>
+          </a:p>
+          <a:p>
+            <a:r>
+              <a:rPr lang="en-US" sz="2800" dirty="0" smtClean="0"/>
+              <a:t>Projecting images on semi-transparent display for interactive, real-world applications.</a:t>
+            </a:r>
+            <a:endParaRPr lang="en-US" sz="2800" dirty="0"/>
           </a:p>
         </p:txBody>
       </p:sp>
@@ -5230,7 +5240,6 @@
               <a:rPr lang="en-US" sz="3600" dirty="0"/>
               <a:t>Augmented reality and location determination methods and apparatus</a:t>
             </a:r>
-            <a:endParaRPr lang="en-US" sz="3600" dirty="0"/>
           </a:p>
         </p:txBody>
       </p:sp>

</xml_diff>